<commit_message>
Update 108 2차 지능형 드론 멘토링 HW 구매 목록 19년 6월 V1.2.1.pptx
</commit_message>
<xml_diff>
--- a/120 구매/108 2차 지능형 드론 멘토링 HW 구매 목록 19년 6월 V1.2.1.pptx
+++ b/120 구매/108 2차 지능형 드론 멘토링 HW 구매 목록 19년 6월 V1.2.1.pptx
@@ -260,7 +260,7 @@
       <p15:sldGuideLst xmlns:p15="http://schemas.microsoft.com/office/powerpoint/2012/main"/>
     </p:ext>
     <p:ext uri="http://customooxmlschemas.google.com/">
-      <go:slidesCustomData xmlns:go="http://customooxmlschemas.google.com/" xmlns:p15="http://schemas.microsoft.com/office/powerpoint/2012/main" xmlns:p14="http://schemas.microsoft.com/office/powerpoint/2010/main" xmlns:com="http://schemas.openxmlformats.org/drawingml/2006/compatibility" xmlns:pvml="urn:schemas-microsoft-com:office:powerpoint" xmlns:v="urn:schemas-microsoft-com:vml" xmlns:o="urn:schemas-microsoft-com:office:office" xmlns:dgm="http://schemas.openxmlformats.org/drawingml/2006/diagram" xmlns:c="http://schemas.openxmlformats.org/drawingml/2006/chart" xmlns:mv="urn:schemas-microsoft-com:mac:vml" xmlns:mc="http://schemas.openxmlformats.org/markup-compatibility/2006" xmlns="" r:id="rId19" roundtripDataSignature="AMtx7mhDtmrrjuDkfHFray89f3AzMYLLmw=="/>
+      <go:slidesCustomData xmlns="" xmlns:mc="http://schemas.openxmlformats.org/markup-compatibility/2006" xmlns:mv="urn:schemas-microsoft-com:mac:vml" xmlns:c="http://schemas.openxmlformats.org/drawingml/2006/chart" xmlns:dgm="http://schemas.openxmlformats.org/drawingml/2006/diagram" xmlns:o="urn:schemas-microsoft-com:office:office" xmlns:v="urn:schemas-microsoft-com:vml" xmlns:pvml="urn:schemas-microsoft-com:office:powerpoint" xmlns:com="http://schemas.openxmlformats.org/drawingml/2006/compatibility" xmlns:p14="http://schemas.microsoft.com/office/powerpoint/2010/main" xmlns:p15="http://schemas.microsoft.com/office/powerpoint/2012/main" xmlns:go="http://customooxmlschemas.google.com/" r:id="rId19" roundtripDataSignature="AMtx7mhDtmrrjuDkfHFray89f3AzMYLLmw=="/>
     </p:ext>
   </p:extLst>
 </p:presentation>
@@ -32713,19 +32713,11 @@
               <a:buChar char="•"/>
             </a:pPr>
             <a:r>
-              <a:rPr lang="ko-KR" altLang="en-US" sz="1480" u="sng" smtClean="0">
-                <a:solidFill>
-                  <a:schemeClr val="hlink"/>
-                </a:solidFill>
-              </a:rPr>
+              <a:rPr lang="ko-KR" altLang="en-US" sz="1480"/>
               <a:t>드론 </a:t>
             </a:r>
             <a:r>
-              <a:rPr lang="en-US" altLang="ko-KR" sz="1480" u="sng" smtClean="0">
-                <a:solidFill>
-                  <a:schemeClr val="hlink"/>
-                </a:solidFill>
-              </a:rPr>
+              <a:rPr lang="en-US" altLang="ko-KR" sz="1480"/>
               <a:t>: F330</a:t>
             </a:r>
           </a:p>
@@ -33668,17 +33660,22 @@
         <p:nvGraphicFramePr>
           <p:cNvPr id="143" name="Google Shape;143;p23"/>
           <p:cNvGraphicFramePr/>
-          <p:nvPr/>
+          <p:nvPr>
+            <p:extLst>
+              <p:ext uri="{D42A27DB-BD31-4B8C-83A1-F6EECF244321}">
+                <p14:modId xmlns:p14="http://schemas.microsoft.com/office/powerpoint/2010/main" val="1230672698"/>
+              </p:ext>
+            </p:extLst>
+          </p:nvPr>
         </p:nvGraphicFramePr>
         <p:xfrm>
           <a:off x="681038" y="1255709"/>
-          <a:ext cx="8543925" cy="3939476"/>
+          <a:ext cx="8543925" cy="3802650"/>
         </p:xfrm>
         <a:graphic>
           <a:graphicData uri="http://schemas.openxmlformats.org/drawingml/2006/table">
             <a:tbl>
               <a:tblPr firstRow="1" bandRow="1">
-                <a:noFill/>
                 <a:tableStyleId>{5C5E4F1C-13F9-4D5A-ACF0-85943E63A805}</a:tableStyleId>
               </a:tblPr>
               <a:tblGrid>
@@ -33689,14 +33686,14 @@
                     </a:ext>
                   </a:extLst>
                 </a:gridCol>
-                <a:gridCol w="1494375">
+                <a:gridCol w="1226063">
                   <a:extLst>
                     <a:ext uri="{9D8B030D-6E8A-4147-A177-3AD203B41FA5}">
                       <a16:colId xmlns:a16="http://schemas.microsoft.com/office/drawing/2014/main" val="20001"/>
                     </a:ext>
                   </a:extLst>
                 </a:gridCol>
-                <a:gridCol w="3668725">
+                <a:gridCol w="3937037">
                   <a:extLst>
                     <a:ext uri="{9D8B030D-6E8A-4147-A177-3AD203B41FA5}">
                       <a16:colId xmlns:a16="http://schemas.microsoft.com/office/drawing/2014/main" val="20002"/>
@@ -33937,13 +33934,7 @@
                         <a:buNone/>
                       </a:pPr>
                       <a:r>
-                        <a:rPr lang="en-US" sz="1400" b="0" i="0" u="none" strike="noStrike" cap="none">
-                          <a:solidFill>
-                            <a:schemeClr val="dk1"/>
-                          </a:solidFill>
-                          <a:latin typeface="Calibri"/>
-                          <a:ea typeface="Calibri"/>
-                          <a:cs typeface="Calibri"/>
+                        <a:rPr lang="en-US" sz="1400" u="none" strike="noStrike" cap="none">
                           <a:sym typeface="Calibri"/>
                         </a:rPr>
                         <a:t>국내</a:t>
@@ -33976,13 +33967,7 @@
                         <a:buNone/>
                       </a:pPr>
                       <a:r>
-                        <a:rPr lang="en-US" sz="1400" b="0" i="0" u="none" strike="noStrike" cap="none">
-                          <a:solidFill>
-                            <a:schemeClr val="dk1"/>
-                          </a:solidFill>
-                          <a:latin typeface="Calibri"/>
-                          <a:ea typeface="Calibri"/>
-                          <a:cs typeface="Calibri"/>
+                        <a:rPr lang="en-US" sz="1400" u="none" strike="noStrike" cap="none">
                           <a:sym typeface="Calibri"/>
                         </a:rPr>
                         <a:t>드론 모터</a:t>
@@ -34023,11 +34008,7 @@
                         <a:buNone/>
                       </a:pPr>
                       <a:r>
-                        <a:rPr lang="en-US" sz="1400" u="none" strike="noStrike" cap="none">
-                          <a:solidFill>
-                            <a:schemeClr val="dk1"/>
-                          </a:solidFill>
-                        </a:rPr>
+                        <a:rPr lang="en-US" sz="1400" u="none" strike="noStrike" cap="none"/>
                         <a:t>Bebop Drone2 </a:t>
                       </a:r>
                       <a:endParaRPr sz="1400" u="none" strike="noStrike" cap="none">
@@ -34062,11 +34043,7 @@
                         <a:buNone/>
                       </a:pPr>
                       <a:r>
-                        <a:rPr lang="en-US" sz="1400" u="none" strike="noStrike" cap="none">
-                          <a:solidFill>
-                            <a:schemeClr val="dk1"/>
-                          </a:solidFill>
-                        </a:rPr>
+                        <a:rPr lang="en-US" sz="1400" u="none" strike="noStrike" cap="none"/>
                         <a:t>13 만원</a:t>
                       </a:r>
                       <a:endParaRPr sz="1400" u="none" strike="noStrike" cap="none">
@@ -34101,11 +34078,7 @@
                         <a:buNone/>
                       </a:pPr>
                       <a:r>
-                        <a:rPr lang="en-US" sz="1400" u="none" strike="noStrike" cap="none">
-                          <a:solidFill>
-                            <a:schemeClr val="dk1"/>
-                          </a:solidFill>
-                        </a:rPr>
+                        <a:rPr lang="en-US" sz="1400" u="none" strike="noStrike" cap="none"/>
                         <a:t>1</a:t>
                       </a:r>
                       <a:endParaRPr sz="1400" u="none" strike="noStrike" cap="none">
@@ -34243,11 +34216,7 @@
                         <a:buNone/>
                       </a:pPr>
                       <a:r>
-                        <a:rPr lang="en-US" sz="1400" u="none" strike="noStrike" cap="none">
-                          <a:solidFill>
-                            <a:schemeClr val="dk1"/>
-                          </a:solidFill>
-                        </a:rPr>
+                        <a:rPr lang="en-US" sz="1400" u="none" strike="noStrike" cap="none"/>
                         <a:t>Bebop 2 Central Cross</a:t>
                       </a:r>
                       <a:endParaRPr sz="1400" u="none" strike="noStrike" cap="none">
@@ -34282,13 +34251,7 @@
                         <a:buNone/>
                       </a:pPr>
                       <a:r>
-                        <a:rPr lang="en-US" sz="1400" b="0" i="0" u="none" strike="noStrike" cap="none">
-                          <a:solidFill>
-                            <a:srgbClr val="000000"/>
-                          </a:solidFill>
-                          <a:latin typeface="Calibri"/>
-                          <a:ea typeface="Calibri"/>
-                          <a:cs typeface="Calibri"/>
+                        <a:rPr lang="en-US" sz="1400" u="none" strike="noStrike" cap="none">
                           <a:sym typeface="Calibri"/>
                         </a:rPr>
                         <a:t>2 만원</a:t>
@@ -34454,11 +34417,7 @@
                         <a:buNone/>
                       </a:pPr>
                       <a:r>
-                        <a:rPr lang="en-US" sz="1400" u="none" strike="noStrike" cap="none">
-                          <a:solidFill>
-                            <a:schemeClr val="dk1"/>
-                          </a:solidFill>
-                        </a:rPr>
+                        <a:rPr lang="en-US" sz="1400" u="none" strike="noStrike" cap="none"/>
                         <a:t>2 만원</a:t>
                       </a:r>
                       <a:endParaRPr sz="1400" u="none" strike="noStrike" cap="none">
@@ -34493,11 +34452,7 @@
                         <a:buNone/>
                       </a:pPr>
                       <a:r>
-                        <a:rPr lang="en-US" sz="1400" u="none" strike="noStrike" cap="none">
-                          <a:solidFill>
-                            <a:schemeClr val="dk1"/>
-                          </a:solidFill>
-                        </a:rPr>
+                        <a:rPr lang="en-US" sz="1400" u="none" strike="noStrike" cap="none"/>
                         <a:t>1</a:t>
                       </a:r>
                       <a:endParaRPr sz="1400" u="none" strike="noStrike" cap="none">
@@ -34768,7 +34723,7 @@
                         <a:buNone/>
                       </a:pPr>
                       <a:r>
-                        <a:rPr lang="en-US" sz="1400" b="0" u="none" strike="noStrike" cap="none"/>
+                        <a:rPr lang="en-US" sz="1400" u="none" strike="noStrike" cap="none"/>
                         <a:t>Spare Part</a:t>
                       </a:r>
                       <a:endParaRPr sz="1400" b="0" u="none" strike="noStrike" cap="none">
@@ -34803,13 +34758,7 @@
                         <a:buNone/>
                       </a:pPr>
                       <a:r>
-                        <a:rPr lang="en-US" sz="1400" b="0" u="none" strike="noStrike" cap="none">
-                          <a:solidFill>
-                            <a:schemeClr val="dk1"/>
-                          </a:solidFill>
-                          <a:latin typeface="Malgun Gothic"/>
-                          <a:ea typeface="Malgun Gothic"/>
-                          <a:cs typeface="Malgun Gothic"/>
+                        <a:rPr lang="en-US" sz="1400" u="none" strike="noStrike" cap="none">
                           <a:sym typeface="Malgun Gothic"/>
                         </a:rPr>
                         <a:t>bebop drone 2 shafts</a:t>
@@ -34850,7 +34799,7 @@
                         <a:buNone/>
                       </a:pPr>
                       <a:r>
-                        <a:rPr lang="en-US" sz="1400" b="0" u="none" strike="noStrike" cap="none"/>
+                        <a:rPr lang="en-US" sz="1400" u="none" strike="noStrike" cap="none"/>
                         <a:t>1만원</a:t>
                       </a:r>
                       <a:endParaRPr sz="1400" b="0" u="none" strike="noStrike" cap="none"/>
@@ -34881,13 +34830,7 @@
                         <a:buNone/>
                       </a:pPr>
                       <a:r>
-                        <a:rPr lang="en-US" sz="1400" b="0" u="none" strike="noStrike" cap="none">
-                          <a:solidFill>
-                            <a:schemeClr val="dk1"/>
-                          </a:solidFill>
-                          <a:latin typeface="Malgun Gothic"/>
-                          <a:ea typeface="Malgun Gothic"/>
-                          <a:cs typeface="Malgun Gothic"/>
+                        <a:rPr lang="en-US" sz="1400" u="none" strike="noStrike" cap="none">
                           <a:sym typeface="Malgun Gothic"/>
                         </a:rPr>
                         <a:t>1</a:t>
@@ -34928,7 +34871,7 @@
                         <a:buNone/>
                       </a:pPr>
                       <a:r>
-                        <a:rPr lang="en-US" sz="1400" b="0" u="none" strike="noStrike" cap="none"/>
+                        <a:rPr lang="en-US" sz="1400" u="none" strike="noStrike" cap="none"/>
                         <a:t>NAVIO 조립</a:t>
                       </a:r>
                       <a:endParaRPr sz="1400" b="0" u="none" strike="noStrike" cap="none">
@@ -35000,11 +34943,7 @@
                         <a:buNone/>
                       </a:pPr>
                       <a:r>
-                        <a:rPr lang="en-US" sz="1400" u="none" strike="noStrike" cap="none">
-                          <a:solidFill>
-                            <a:schemeClr val="dk1"/>
-                          </a:solidFill>
-                        </a:rPr>
+                        <a:rPr lang="en-US" sz="1400" u="none" strike="noStrike" cap="none"/>
                         <a:t>케이블</a:t>
                       </a:r>
                       <a:endParaRPr sz="1400" u="none" strike="noStrike" cap="none">
@@ -35034,11 +34973,7 @@
                         <a:buNone/>
                       </a:pPr>
                       <a:r>
-                        <a:rPr lang="en-US" sz="1400" u="none" strike="noStrike" cap="none">
-                          <a:solidFill>
-                            <a:schemeClr val="dk1"/>
-                          </a:solidFill>
-                        </a:rPr>
+                        <a:rPr lang="en-US" sz="1400" u="none" strike="noStrike" cap="none"/>
                         <a:t>XT-60 케이블</a:t>
                       </a:r>
                       <a:endParaRPr sz="1400" u="none" strike="noStrike" cap="none">
@@ -35068,11 +35003,7 @@
                         <a:buNone/>
                       </a:pPr>
                       <a:r>
-                        <a:rPr lang="en-US" sz="1400" u="none" strike="noStrike" cap="none">
-                          <a:solidFill>
-                            <a:schemeClr val="dk1"/>
-                          </a:solidFill>
-                        </a:rPr>
+                        <a:rPr lang="en-US" sz="1400" u="none" strike="noStrike" cap="none"/>
                         <a:t>3,000 원</a:t>
                       </a:r>
                       <a:endParaRPr sz="1400" u="none" strike="noStrike" cap="none">
@@ -35102,11 +35033,7 @@
                         <a:buNone/>
                       </a:pPr>
                       <a:r>
-                        <a:rPr lang="en-US" sz="1400" u="none" strike="noStrike" cap="none">
-                          <a:solidFill>
-                            <a:schemeClr val="dk1"/>
-                          </a:solidFill>
-                        </a:rPr>
+                        <a:rPr lang="en-US" sz="1400" u="none" strike="noStrike" cap="none"/>
                         <a:t>1</a:t>
                       </a:r>
                       <a:endParaRPr/>
@@ -35205,13 +35132,7 @@
                         <a:buNone/>
                       </a:pPr>
                       <a:r>
-                        <a:rPr lang="en-US" sz="1400" b="0" u="none" strike="noStrike" cap="none">
-                          <a:solidFill>
-                            <a:schemeClr val="dk1"/>
-                          </a:solidFill>
-                          <a:latin typeface="Malgun Gothic"/>
-                          <a:ea typeface="Malgun Gothic"/>
-                          <a:cs typeface="Malgun Gothic"/>
+                        <a:rPr lang="en-US" sz="1400" u="none" strike="noStrike" cap="none">
                           <a:sym typeface="Malgun Gothic"/>
                         </a:rPr>
                         <a:t>배터리</a:t>
@@ -35252,11 +35173,7 @@
                         <a:buNone/>
                       </a:pPr>
                       <a:r>
-                        <a:rPr lang="en-US" sz="1400" u="none" strike="noStrike" cap="none">
-                          <a:solidFill>
-                            <a:schemeClr val="dk1"/>
-                          </a:solidFill>
-                        </a:rPr>
+                        <a:rPr lang="en-US" sz="1400" u="none" strike="noStrike" cap="none"/>
                         <a:t>VEGA베가 그래핀3셀 1300mAh 35C 배터리</a:t>
                       </a:r>
                       <a:endParaRPr/>
@@ -35287,11 +35204,7 @@
                         <a:buNone/>
                       </a:pPr>
                       <a:r>
-                        <a:rPr lang="en-US" sz="1400" u="none" strike="noStrike" cap="none">
-                          <a:solidFill>
-                            <a:schemeClr val="dk1"/>
-                          </a:solidFill>
-                        </a:rPr>
+                        <a:rPr lang="en-US" sz="1400" u="none" strike="noStrike" cap="none"/>
                         <a:t> 15,000원</a:t>
                       </a:r>
                       <a:endParaRPr sz="1400" u="none" strike="noStrike" cap="none">
@@ -35326,11 +35239,7 @@
                         <a:buNone/>
                       </a:pPr>
                       <a:r>
-                        <a:rPr lang="en-US" sz="1400" u="none" strike="noStrike" cap="none">
-                          <a:solidFill>
-                            <a:schemeClr val="dk1"/>
-                          </a:solidFill>
-                        </a:rPr>
+                        <a:rPr lang="en-US" sz="1400" u="none" strike="noStrike" cap="none"/>
                         <a:t>1</a:t>
                       </a:r>
                       <a:endParaRPr sz="1400" u="none" strike="noStrike" cap="none">
@@ -35360,11 +35269,7 @@
                         <a:buNone/>
                       </a:pPr>
                       <a:r>
-                        <a:rPr lang="en-US" sz="1400" u="none" strike="noStrike" cap="none">
-                          <a:solidFill>
-                            <a:schemeClr val="dk1"/>
-                          </a:solidFill>
-                        </a:rPr>
+                        <a:rPr lang="en-US" sz="1400" u="none" strike="noStrike" cap="none"/>
                         <a:t>NAVIO 조립</a:t>
                       </a:r>
                       <a:endParaRPr sz="1400" u="none" strike="sngStrike" cap="none">
@@ -35437,13 +35342,7 @@
                         <a:buNone/>
                       </a:pPr>
                       <a:r>
-                        <a:rPr lang="en-US" sz="1400" b="0" u="none" strike="noStrike" cap="none">
-                          <a:solidFill>
-                            <a:schemeClr val="dk1"/>
-                          </a:solidFill>
-                          <a:latin typeface="Malgun Gothic"/>
-                          <a:ea typeface="Malgun Gothic"/>
-                          <a:cs typeface="Malgun Gothic"/>
+                        <a:rPr lang="en-US" sz="1400" u="none" strike="noStrike" cap="none">
                           <a:sym typeface="Malgun Gothic"/>
                         </a:rPr>
                         <a:t>ESC</a:t>
@@ -35466,7 +35365,7 @@
                     <a:bodyPr/>
                     <a:lstStyle/>
                     <a:p>
-                      <a:pPr marL="0" lvl="0" indent="0" algn="l" rtl="0">
+                      <a:pPr marL="0" lvl="0" indent="0" algn="ctr" rtl="0">
                         <a:lnSpc>
                           <a:spcPct val="115000"/>
                         </a:lnSpc>
@@ -35484,15 +35383,12 @@
                         <a:buNone/>
                       </a:pPr>
                       <a:r>
-                        <a:rPr lang="en-US" sz="1300" b="1">
-                          <a:latin typeface="Arial"/>
-                          <a:ea typeface="Arial"/>
-                          <a:cs typeface="Arial"/>
+                        <a:rPr lang="en-US" sz="1300">
                           <a:sym typeface="Arial"/>
                         </a:rPr>
                         <a:t>12A BL ESC for FPV Racing(OneShot 125/BEC)</a:t>
                       </a:r>
-                      <a:endParaRPr/>
+                      <a:endParaRPr b="0"/>
                     </a:p>
                   </a:txBody>
                   <a:tcPr marL="91450" marR="91450" marT="45725" marB="45725" anchor="ctr"/>

</xml_diff>